<commit_message>
Added PPT presentation in Presentation folder and minor text correction in notebook.ipynb
</commit_message>
<xml_diff>
--- a/Presentation/Predicting Popular Recipes Presentation.pptx
+++ b/Presentation/Predicting Popular Recipes Presentation.pptx
@@ -116,6 +116,14 @@
       </a:defRPr>
     </a:lvl9pPr>
   </p:defaultTextStyle>
+  <p:extLst>
+    <p:ext uri="{EFAFB233-063F-42B5-8137-9DF3F51BA10A}">
+      <p15:sldGuideLst xmlns:p15="http://schemas.microsoft.com/office/powerpoint/2012/main"/>
+    </p:ext>
+    <p:ext uri="{2D200454-40CA-4A62-9FC3-DE9A4176ACB9}">
+      <p15:notesGuideLst xmlns:p15="http://schemas.microsoft.com/office/powerpoint/2012/main"/>
+    </p:ext>
+  </p:extLst>
 </p:presentation>
 </file>
 
@@ -519,13 +527,13 @@
             </a:pPr>
             <a:r>
               <a:rPr lang="en-GB" dirty="0"/>
-              <a:t>Self Introduction</a:t>
-            </a:r>
-          </a:p>
-          <a:p>
-            <a:pPr marL="171450" indent="-171450">
+              <a:t>Hi, my name is Julio. I was given the task of helping your product team. I will tell you about</a:t>
+            </a:r>
+          </a:p>
+          <a:p>
+            <a:pPr marL="0" indent="0">
               <a:buFont typeface="Arial" panose="020B0604020202020204" pitchFamily="34" charset="0"/>
-              <a:buChar char="•"/>
+              <a:buNone/>
             </a:pPr>
             <a:r>
               <a:rPr lang="en-GB" dirty="0"/>
@@ -639,17 +647,7 @@
                 <a:effectLst/>
                 <a:latin typeface="Consolas" panose="020B0609020204030204" pitchFamily="49" charset="0"/>
               </a:rPr>
-              <a:t>To achieve the goal of predicting high-traffic recipes, I recommend utilizing the Logistic Regression model. With the Logistic Regression model achieving approximately 80% precision, we can expect reliable identification of recipes that will generate high traffic. </a:t>
-            </a:r>
-            <a:r>
-              <a:rPr lang="en-US" b="0">
-                <a:solidFill>
-                  <a:srgbClr val="CCCCCC"/>
-                </a:solidFill>
-                <a:effectLst/>
-                <a:latin typeface="Consolas" panose="020B0609020204030204" pitchFamily="49" charset="0"/>
-              </a:rPr>
-              <a:t>To ensure effective implementation and continuous improvement, I suggest the following steps:</a:t>
+              <a:t>To achieve the goal of predicting high-traffic recipes, I recommend utilizing the Logistic Regression model. With the Logistic Regression model achieving approximately 80% precision, we can expect reliable identification of recipes that will generate high traffic. To ensure effective implementation and continuous improvement, I suggest the following steps:</a:t>
             </a:r>
           </a:p>
           <a:p>
@@ -798,7 +796,15 @@
             </a:pPr>
             <a:r>
               <a:rPr lang="en-GB" dirty="0"/>
-              <a:t>The process of choosing the recipes to be shown in the home page is manual, and there is no constraints when choosing the recipe.</a:t>
+              <a:t>The </a:t>
+            </a:r>
+            <a:r>
+              <a:rPr lang="en-GB" dirty="0" err="1"/>
+              <a:t>producting</a:t>
+            </a:r>
+            <a:r>
+              <a:rPr lang="en-GB" dirty="0"/>
+              <a:t> is making the process of choosing manually, and there is no constraints when choosing the recipe.</a:t>
             </a:r>
           </a:p>
           <a:p>
@@ -815,7 +821,7 @@
             </a:pPr>
             <a:r>
               <a:rPr lang="en-GB" dirty="0"/>
-              <a:t>We want to support the product team in creating a machine learning model that can predict with 80% correct guests which recipe should be shown on their home page.</a:t>
+              <a:t>We want to support the product team in creating a machine learning model that can correctly predict with 80% precision which recipe should be shown on home page.</a:t>
             </a:r>
           </a:p>
         </p:txBody>
@@ -906,7 +912,7 @@
             </a:pPr>
             <a:r>
               <a:rPr lang="en-GB" dirty="0"/>
-              <a:t>The data provided contains 947 observations and eight columns</a:t>
+              <a:t>The high-traffic label highlights if there was an increase of 40% in traffic when using the recipe on the home page.</a:t>
             </a:r>
           </a:p>
           <a:p>
@@ -916,34 +922,6 @@
             </a:pPr>
             <a:r>
               <a:rPr lang="en-GB" dirty="0"/>
-              <a:t>The data </a:t>
-            </a:r>
-            <a:r>
-              <a:rPr lang="en-US" dirty="0"/>
-              <a:t>consists of information displayed </a:t>
-            </a:r>
-            <a:r>
-              <a:rPr lang="en-GB" dirty="0"/>
-              <a:t>to our clients and internal information on the website traffic.</a:t>
-            </a:r>
-          </a:p>
-          <a:p>
-            <a:pPr marL="171450" indent="-171450">
-              <a:buFont typeface="Arial" panose="020B0604020202020204" pitchFamily="34" charset="0"/>
-              <a:buChar char="•"/>
-            </a:pPr>
-            <a:r>
-              <a:rPr lang="en-GB" dirty="0"/>
-              <a:t>The high-traffic label highlights if there was an increase of 40% in traffic when using the recipe on the home page.</a:t>
-            </a:r>
-          </a:p>
-          <a:p>
-            <a:pPr marL="171450" indent="-171450">
-              <a:buFont typeface="Arial" panose="020B0604020202020204" pitchFamily="34" charset="0"/>
-              <a:buChar char="•"/>
-            </a:pPr>
-            <a:r>
-              <a:rPr lang="en-GB" dirty="0"/>
               <a:t>In the data, I had to deal with:</a:t>
             </a:r>
           </a:p>
@@ -954,30 +932,7 @@
             </a:pPr>
             <a:r>
               <a:rPr lang="en-GB" dirty="0"/>
-              <a:t>missing values for some observations: Some recipes didn’t have their nutrients</a:t>
-            </a:r>
-          </a:p>
-          <a:p>
-            <a:pPr marL="628650" marR="0" lvl="1" indent="-171450" algn="l" defTabSz="914400" rtl="0" eaLnBrk="1" fontAlgn="auto" latinLnBrk="0" hangingPunct="1">
-              <a:lnSpc>
-                <a:spcPct val="100000"/>
-              </a:lnSpc>
-              <a:spcBef>
-                <a:spcPts val="0"/>
-              </a:spcBef>
-              <a:spcAft>
-                <a:spcPts val="0"/>
-              </a:spcAft>
-              <a:buClrTx/>
-              <a:buSzTx/>
-              <a:buFont typeface="Arial" panose="020B0604020202020204" pitchFamily="34" charset="0"/>
-              <a:buChar char="•"/>
-              <a:tabLst/>
-              <a:defRPr/>
-            </a:pPr>
-            <a:r>
-              <a:rPr lang="en-GB" dirty="0"/>
-              <a:t>Incorrect category type: ‘Chicken Breast’ and ‘Chicken’ should be in the same category</a:t>
+              <a:t>missing values,</a:t>
             </a:r>
           </a:p>
           <a:p>
@@ -987,7 +942,7 @@
             </a:pPr>
             <a:r>
               <a:rPr lang="en-GB" dirty="0"/>
-              <a:t>Type Inconsistency: Some observations had the number of servings and a string following, for example: ‘4 as a snack’</a:t>
+              <a:t>Category Mismatch: ‘Chicken Breast’ and ‘Chicken’</a:t>
             </a:r>
           </a:p>
           <a:p>
@@ -997,7 +952,7 @@
             </a:pPr>
             <a:r>
               <a:rPr lang="en-GB" dirty="0"/>
-              <a:t>Missing Target Variable: The target variable, high traffic, had null values for the recipes that didn’t bring high traffic.</a:t>
+              <a:t>And others cleaning tasks</a:t>
             </a:r>
           </a:p>
         </p:txBody>
@@ -1087,6 +1042,45 @@
               <a:buChar char="•"/>
             </a:pPr>
             <a:r>
+              <a:rPr lang="en-US" b="0" dirty="0" err="1">
+                <a:solidFill>
+                  <a:srgbClr val="CCCCCC"/>
+                </a:solidFill>
+                <a:effectLst/>
+                <a:latin typeface="Consolas" panose="020B0609020204030204" pitchFamily="49" charset="0"/>
+              </a:rPr>
+              <a:t>Analysing</a:t>
+            </a:r>
+            <a:r>
+              <a:rPr lang="en-US" b="0" dirty="0">
+                <a:solidFill>
+                  <a:srgbClr val="CCCCCC"/>
+                </a:solidFill>
+                <a:effectLst/>
+                <a:latin typeface="Consolas" panose="020B0609020204030204" pitchFamily="49" charset="0"/>
+              </a:rPr>
+              <a:t> category distribution, we can see that</a:t>
+            </a:r>
+          </a:p>
+          <a:p>
+            <a:pPr marL="171450" indent="-171450">
+              <a:buFont typeface="Arial" panose="020B0604020202020204" pitchFamily="34" charset="0"/>
+              <a:buChar char="•"/>
+            </a:pPr>
+            <a:endParaRPr lang="en-US" b="0" dirty="0">
+              <a:solidFill>
+                <a:srgbClr val="CCCCCC"/>
+              </a:solidFill>
+              <a:effectLst/>
+              <a:latin typeface="Consolas" panose="020B0609020204030204" pitchFamily="49" charset="0"/>
+            </a:endParaRPr>
+          </a:p>
+          <a:p>
+            <a:pPr marL="171450" indent="-171450">
+              <a:buFont typeface="Arial" panose="020B0604020202020204" pitchFamily="34" charset="0"/>
+              <a:buChar char="•"/>
+            </a:pPr>
+            <a:r>
               <a:rPr lang="en-US" b="0" dirty="0">
                 <a:solidFill>
                   <a:srgbClr val="CCCCCC"/>
@@ -1224,62 +1218,6 @@
                 <a:effectLst/>
                 <a:latin typeface="Consolas" panose="020B0609020204030204" pitchFamily="49" charset="0"/>
               </a:rPr>
-              <a:t>When </a:t>
-            </a:r>
-            <a:r>
-              <a:rPr lang="en-US" b="0" dirty="0" err="1">
-                <a:solidFill>
-                  <a:srgbClr val="CCCCCC"/>
-                </a:solidFill>
-                <a:effectLst/>
-                <a:latin typeface="Consolas" panose="020B0609020204030204" pitchFamily="49" charset="0"/>
-              </a:rPr>
-              <a:t>analysing</a:t>
-            </a:r>
-            <a:r>
-              <a:rPr lang="en-US" b="0" dirty="0">
-                <a:solidFill>
-                  <a:srgbClr val="CCCCCC"/>
-                </a:solidFill>
-                <a:effectLst/>
-                <a:latin typeface="Consolas" panose="020B0609020204030204" pitchFamily="49" charset="0"/>
-              </a:rPr>
-              <a:t> the relationship between the feature </a:t>
-            </a:r>
-            <a:r>
-              <a:rPr lang="en-US" b="1" dirty="0">
-                <a:solidFill>
-                  <a:srgbClr val="569CD6"/>
-                </a:solidFill>
-                <a:effectLst/>
-                <a:latin typeface="Consolas" panose="020B0609020204030204" pitchFamily="49" charset="0"/>
-              </a:rPr>
-              <a:t>category and the target feature, high traffic, I noticed that 'Vegetable', 'Potato' and 'Pork' meals are more likely to bring high</a:t>
-            </a:r>
-            <a:r>
-              <a:rPr lang="en-US" b="0" dirty="0">
-                <a:solidFill>
-                  <a:srgbClr val="CCCCCC"/>
-                </a:solidFill>
-                <a:effectLst/>
-                <a:latin typeface="Consolas" panose="020B0609020204030204" pitchFamily="49" charset="0"/>
-              </a:rPr>
-              <a:t> traffic. In contrast, 'Beverages', 'Breakfast', and 'Chicken' are unlikely to bring High traffic.</a:t>
-            </a:r>
-          </a:p>
-          <a:p>
-            <a:pPr marL="171450" indent="-171450">
-              <a:buFont typeface="Arial" panose="020B0604020202020204" pitchFamily="34" charset="0"/>
-              <a:buChar char="•"/>
-            </a:pPr>
-            <a:r>
-              <a:rPr lang="en-US" b="0" dirty="0">
-                <a:solidFill>
-                  <a:srgbClr val="CCCCCC"/>
-                </a:solidFill>
-                <a:effectLst/>
-                <a:latin typeface="Consolas" panose="020B0609020204030204" pitchFamily="49" charset="0"/>
-              </a:rPr>
               <a:t>For example, when a ‘Vegetable’ recipe was shown on our home page, our website reached a high volume traffic seventy-seven times, and it didn’t achieve high traffic only once.</a:t>
             </a:r>
           </a:p>
@@ -1570,7 +1508,7 @@
             </a:r>
           </a:p>
           <a:p>
-            <a:pPr marL="171450" marR="0" lvl="0" indent="-171450" algn="l" defTabSz="914400" rtl="0" eaLnBrk="1" fontAlgn="auto" latinLnBrk="0" hangingPunct="1">
+            <a:pPr marL="0" marR="0" lvl="0" indent="0" algn="l" defTabSz="914400" rtl="0" eaLnBrk="1" fontAlgn="auto" latinLnBrk="0" hangingPunct="1">
               <a:lnSpc>
                 <a:spcPct val="100000"/>
               </a:lnSpc>
@@ -1583,7 +1521,7 @@
               <a:buClrTx/>
               <a:buSzTx/>
               <a:buFont typeface="Arial" panose="020B0604020202020204" pitchFamily="34" charset="0"/>
-              <a:buChar char="•"/>
+              <a:buNone/>
               <a:tabLst/>
               <a:defRPr/>
             </a:pPr>
@@ -1699,8 +1637,21 @@
                 <a:effectLst/>
                 <a:latin typeface="Consolas" panose="020B0609020204030204" pitchFamily="49" charset="0"/>
               </a:rPr>
-              <a:t>The Precision value of the Logistic Regression model is approximately 0.80, indicating that the model correctly predicts high traffic recipes 80% of the time. In comparison, the Random Forest Classifier achieves a Precision of about 0.77.</a:t>
-            </a:r>
+              <a:t>The Precision value of the Logistic Regression model is approximately 0.80, indicating that the model correctly predicts high-traffic recipes 80% of the time. In comparison, the Random Forest Classifier achieves a Precision of about 0.77.</a:t>
+            </a:r>
+          </a:p>
+          <a:p>
+            <a:pPr marL="171450" indent="-171450">
+              <a:buFont typeface="Arial" panose="020B0604020202020204" pitchFamily="34" charset="0"/>
+              <a:buChar char="•"/>
+            </a:pPr>
+            <a:endParaRPr lang="en-US" b="0" dirty="0">
+              <a:solidFill>
+                <a:srgbClr val="CCCCCC"/>
+              </a:solidFill>
+              <a:effectLst/>
+              <a:latin typeface="Consolas" panose="020B0609020204030204" pitchFamily="49" charset="0"/>
+            </a:endParaRPr>
           </a:p>
           <a:p>
             <a:pPr marL="171450" marR="0" lvl="0" indent="-171450" algn="l" defTabSz="914400" rtl="0" eaLnBrk="1" fontAlgn="auto" latinLnBrk="0" hangingPunct="1">
@@ -1768,7 +1719,7 @@
                 <a:effectLst/>
                 <a:latin typeface="Consolas" panose="020B0609020204030204" pitchFamily="49" charset="0"/>
               </a:rPr>
-              <a:t>, the Logistic Regression model shows a Specificity of approximately 0.70, the Random Forest Classifier has a Specificity of around 0.65.</a:t>
+              <a:t>, the Logistic Regression model shows a Specificity of approximately 0.70, and the Random Forest Classifier has a Specificity of around 0.65.</a:t>
             </a:r>
           </a:p>
           <a:p>
@@ -1823,7 +1774,7 @@
                 <a:effectLst/>
                 <a:latin typeface="Consolas" panose="020B0609020204030204" pitchFamily="49" charset="0"/>
               </a:rPr>
-              <a:t>Overall, the results demonstrate that the Logistic Regression model not only has a higher Precision but also better Specificity compared to the Random Forest Classifier. This suggests that Logistic Regression is more effective in minimizing the chances of incorrectly predicting recipes that will generate low traffic, aligning with the goal of the analysis.</a:t>
+              <a:t>Overall, the results demonstrate that the Logistic Regression model has a higher Precision and better Specificity than the Random Forest Classifier. This suggests that logistic regression is more effective in minimizing the chances of incorrectly predicting recipes that will generate low traffic, which aligns with the goal of the analysis.</a:t>
             </a:r>
           </a:p>
           <a:p>
@@ -6581,7 +6532,7 @@
             </a:pPr>
             <a:r>
               <a:rPr lang="en-US" dirty="0"/>
-              <a:t>Deploy the model on the website.</a:t>
+              <a:t>Deploy the model to predict how likely the recipe is to bring high traffic, and only use recipes with positive value on the website.</a:t>
             </a:r>
           </a:p>
           <a:p>

</xml_diff>